<commit_message>
Some changes in Version2
</commit_message>
<xml_diff>
--- a/Group_5-Presentation-V1_2.pptx
+++ b/Group_5-Presentation-V1_2.pptx
@@ -5,7 +5,7 @@
     <p:sldMasterId id="2147483831" r:id="rId1"/>
   </p:sldMasterIdLst>
   <p:notesMasterIdLst>
-    <p:notesMasterId r:id="rId30"/>
+    <p:notesMasterId r:id="rId29"/>
   </p:notesMasterIdLst>
   <p:sldIdLst>
     <p:sldId id="256" r:id="rId2"/>
@@ -33,9 +33,8 @@
     <p:sldId id="295" r:id="rId24"/>
     <p:sldId id="300" r:id="rId25"/>
     <p:sldId id="296" r:id="rId26"/>
-    <p:sldId id="270" r:id="rId27"/>
-    <p:sldId id="268" r:id="rId28"/>
-    <p:sldId id="269" r:id="rId29"/>
+    <p:sldId id="268" r:id="rId27"/>
+    <p:sldId id="269" r:id="rId28"/>
   </p:sldIdLst>
   <p:sldSz cx="9144000" cy="5143500" type="screen16x9"/>
   <p:notesSz cx="6858000" cy="9144000"/>
@@ -1381,7 +1380,7 @@
   <p:cSld>
     <p:spTree>
       <p:nvGrpSpPr>
-        <p:cNvPr id="1" name="Shape 155"/>
+        <p:cNvPr id="1" name="Shape 143"/>
         <p:cNvGrpSpPr/>
         <p:nvPr/>
       </p:nvGrpSpPr>
@@ -1395,7 +1394,7 @@
       </p:grpSpPr>
       <p:sp>
         <p:nvSpPr>
-          <p:cNvPr id="156" name="Google Shape;156;gde171d7bf4_3_0:notes"/>
+          <p:cNvPr id="144" name="Google Shape;144;gdd011ce516_0_35:notes"/>
           <p:cNvSpPr>
             <a:spLocks noGrp="1" noRot="1" noChangeAspect="1"/>
           </p:cNvSpPr>
@@ -1436,7 +1435,7 @@
       </p:sp>
       <p:sp>
         <p:nvSpPr>
-          <p:cNvPr id="157" name="Google Shape;157;gde171d7bf4_3_0:notes"/>
+          <p:cNvPr id="145" name="Google Shape;145;gdd011ce516_0_35:notes"/>
           <p:cNvSpPr txBox="1">
             <a:spLocks noGrp="1"/>
           </p:cNvSpPr>
@@ -1481,110 +1480,6 @@
 </file>
 
 <file path=ppt/notesSlides/notesSlide16.xml><?xml version="1.0" encoding="utf-8"?>
-<p:notes xmlns:a="http://schemas.openxmlformats.org/drawingml/2006/main" xmlns:r="http://schemas.openxmlformats.org/officeDocument/2006/relationships" xmlns:p="http://schemas.openxmlformats.org/presentationml/2006/main" showMasterSp="0" showMasterPhAnim="0">
-  <p:cSld>
-    <p:spTree>
-      <p:nvGrpSpPr>
-        <p:cNvPr id="1" name="Shape 143"/>
-        <p:cNvGrpSpPr/>
-        <p:nvPr/>
-      </p:nvGrpSpPr>
-      <p:grpSpPr>
-        <a:xfrm>
-          <a:off x="0" y="0"/>
-          <a:ext cx="0" cy="0"/>
-          <a:chOff x="0" y="0"/>
-          <a:chExt cx="0" cy="0"/>
-        </a:xfrm>
-      </p:grpSpPr>
-      <p:sp>
-        <p:nvSpPr>
-          <p:cNvPr id="144" name="Google Shape;144;gdd011ce516_0_35:notes"/>
-          <p:cNvSpPr>
-            <a:spLocks noGrp="1" noRot="1" noChangeAspect="1"/>
-          </p:cNvSpPr>
-          <p:nvPr>
-            <p:ph type="sldImg" idx="2"/>
-          </p:nvPr>
-        </p:nvSpPr>
-        <p:spPr>
-          <a:xfrm>
-            <a:off x="381000" y="685800"/>
-            <a:ext cx="6096000" cy="3429000"/>
-          </a:xfrm>
-          <a:custGeom>
-            <a:avLst/>
-            <a:gdLst/>
-            <a:ahLst/>
-            <a:cxnLst/>
-            <a:rect l="l" t="t" r="r" b="b"/>
-            <a:pathLst>
-              <a:path w="120000" h="120000" extrusionOk="0">
-                <a:moveTo>
-                  <a:pt x="0" y="0"/>
-                </a:moveTo>
-                <a:lnTo>
-                  <a:pt x="120000" y="0"/>
-                </a:lnTo>
-                <a:lnTo>
-                  <a:pt x="120000" y="120000"/>
-                </a:lnTo>
-                <a:lnTo>
-                  <a:pt x="0" y="120000"/>
-                </a:lnTo>
-                <a:close/>
-              </a:path>
-            </a:pathLst>
-          </a:custGeom>
-        </p:spPr>
-      </p:sp>
-      <p:sp>
-        <p:nvSpPr>
-          <p:cNvPr id="145" name="Google Shape;145;gdd011ce516_0_35:notes"/>
-          <p:cNvSpPr txBox="1">
-            <a:spLocks noGrp="1"/>
-          </p:cNvSpPr>
-          <p:nvPr>
-            <p:ph type="body" idx="1"/>
-          </p:nvPr>
-        </p:nvSpPr>
-        <p:spPr>
-          <a:xfrm>
-            <a:off x="685800" y="4343400"/>
-            <a:ext cx="5486400" cy="4114800"/>
-          </a:xfrm>
-          <a:prstGeom prst="rect">
-            <a:avLst/>
-          </a:prstGeom>
-        </p:spPr>
-        <p:txBody>
-          <a:bodyPr spcFirstLastPara="1" wrap="square" lIns="91425" tIns="91425" rIns="91425" bIns="91425" anchor="t" anchorCtr="0">
-            <a:noAutofit/>
-          </a:bodyPr>
-          <a:lstStyle/>
-          <a:p>
-            <a:pPr marL="0" lvl="0" indent="0" algn="l" rtl="0">
-              <a:spcBef>
-                <a:spcPts val="0"/>
-              </a:spcBef>
-              <a:spcAft>
-                <a:spcPts val="0"/>
-              </a:spcAft>
-              <a:buNone/>
-            </a:pPr>
-            <a:endParaRPr/>
-          </a:p>
-        </p:txBody>
-      </p:sp>
-    </p:spTree>
-  </p:cSld>
-  <p:clrMapOvr>
-    <a:masterClrMapping/>
-  </p:clrMapOvr>
-</p:notes>
-</file>
-
-<file path=ppt/notesSlides/notesSlide17.xml><?xml version="1.0" encoding="utf-8"?>
 <p:notes xmlns:a="http://schemas.openxmlformats.org/drawingml/2006/main" xmlns:r="http://schemas.openxmlformats.org/officeDocument/2006/relationships" xmlns:p="http://schemas.openxmlformats.org/presentationml/2006/main" showMasterSp="0" showMasterPhAnim="0">
   <p:cSld>
     <p:spTree>
@@ -11384,7 +11279,12 @@
             <p:ph type="body" idx="1"/>
           </p:nvPr>
         </p:nvSpPr>
-        <p:spPr/>
+        <p:spPr>
+          <a:xfrm>
+            <a:off x="873940" y="1286605"/>
+            <a:ext cx="8203153" cy="3416400"/>
+          </a:xfrm>
+        </p:spPr>
         <p:txBody>
           <a:bodyPr>
             <a:normAutofit/>
@@ -11392,6 +11292,9 @@
           <a:lstStyle/>
           <a:p>
             <a:pPr marL="114300" indent="0">
+              <a:lnSpc>
+                <a:spcPct val="100000"/>
+              </a:lnSpc>
               <a:buNone/>
             </a:pPr>
             <a:r>
@@ -11404,105 +11307,146 @@
             </a:r>
             <a:r>
               <a:rPr lang="en-US" sz="1400" dirty="0"/>
-              <a:t> Foundation Statistics Agency of the State of São Paulo : </a:t>
-            </a:r>
-            <a:r>
-              <a:rPr lang="en-US" sz="1400" dirty="0">
+              <a:t> Foundation Statistics Agency of the State of São Paulo </a:t>
+            </a:r>
+          </a:p>
+          <a:p>
+            <a:pPr marL="571500" lvl="1" indent="0">
+              <a:lnSpc>
+                <a:spcPct val="100000"/>
+              </a:lnSpc>
+              <a:buNone/>
+            </a:pPr>
+            <a:r>
+              <a:rPr lang="en-US" sz="800" dirty="0">
                 <a:hlinkClick r:id="rId3"/>
               </a:rPr>
               <a:t>https://saludata.saludcapital.gov.co/osb/index.php/datos-de-salud/enfermedades-trasmisibles/covid19/</a:t>
             </a:r>
+            <a:endParaRPr lang="en-US" sz="800" dirty="0"/>
+          </a:p>
+          <a:p>
+            <a:pPr marL="114300" indent="0">
+              <a:lnSpc>
+                <a:spcPct val="100000"/>
+              </a:lnSpc>
+              <a:buNone/>
+            </a:pPr>
             <a:endParaRPr lang="en-US" sz="1400" dirty="0"/>
           </a:p>
           <a:p>
             <a:pPr marL="114300" indent="0">
-              <a:buNone/>
-            </a:pPr>
-            <a:endParaRPr lang="en-US" sz="1400" dirty="0"/>
-          </a:p>
-          <a:p>
-            <a:pPr marL="114300" indent="0">
-              <a:buNone/>
-            </a:pPr>
-            <a:endParaRPr lang="en-US" sz="1400" dirty="0"/>
-          </a:p>
-          <a:p>
-            <a:pPr marL="114300" indent="0">
+              <a:lnSpc>
+                <a:spcPct val="100000"/>
+              </a:lnSpc>
               <a:buNone/>
             </a:pPr>
             <a:r>
               <a:rPr lang="en-US" sz="1400" dirty="0"/>
-              <a:t>[2] NYC Department of Health and Mental Hygiene: </a:t>
-            </a:r>
-            <a:r>
-              <a:rPr lang="en-US" sz="1400" dirty="0">
+              <a:t>[2] NYC Department of Health and Mental Hygiene </a:t>
+            </a:r>
+          </a:p>
+          <a:p>
+            <a:pPr marL="571500" lvl="1" indent="0">
+              <a:lnSpc>
+                <a:spcPct val="100000"/>
+              </a:lnSpc>
+              <a:buNone/>
+            </a:pPr>
+            <a:r>
+              <a:rPr lang="en-US" sz="800" dirty="0">
                 <a:hlinkClick r:id="rId4"/>
               </a:rPr>
               <a:t>https://github.com/nychealth/coronavirus-data</a:t>
             </a:r>
+            <a:endParaRPr lang="en-US" sz="800" dirty="0"/>
+          </a:p>
+          <a:p>
+            <a:pPr marL="114300" indent="0">
+              <a:lnSpc>
+                <a:spcPct val="100000"/>
+              </a:lnSpc>
+              <a:buNone/>
+            </a:pPr>
             <a:endParaRPr lang="en-US" sz="1400" dirty="0"/>
           </a:p>
           <a:p>
             <a:pPr marL="114300" indent="0">
+              <a:lnSpc>
+                <a:spcPct val="100000"/>
+              </a:lnSpc>
               <a:buNone/>
             </a:pPr>
             <a:r>
               <a:rPr lang="en-US" sz="1400" dirty="0"/>
-              <a:t> </a:t>
-            </a:r>
-          </a:p>
-          <a:p>
-            <a:pPr marL="114300" indent="0">
-              <a:buNone/>
-            </a:pPr>
-            <a:endParaRPr lang="en-US" sz="1400" dirty="0"/>
-          </a:p>
-          <a:p>
-            <a:pPr marL="114300" indent="0">
-              <a:buNone/>
-            </a:pPr>
-            <a:r>
-              <a:rPr lang="en-US" sz="1400" dirty="0"/>
-              <a:t>[3] Open Weather Map: </a:t>
-            </a:r>
-            <a:r>
-              <a:rPr lang="en-US" sz="1400" dirty="0">
+              <a:t>[3] Open Weather Map</a:t>
+            </a:r>
+          </a:p>
+          <a:p>
+            <a:pPr marL="571500" lvl="1" indent="0">
+              <a:lnSpc>
+                <a:spcPct val="100000"/>
+              </a:lnSpc>
+              <a:buNone/>
+            </a:pPr>
+            <a:r>
+              <a:rPr lang="en-US" sz="800" dirty="0">
                 <a:hlinkClick r:id="rId5"/>
               </a:rPr>
               <a:t>www.openweathermap.org</a:t>
             </a:r>
+            <a:endParaRPr lang="en-US" sz="1000" dirty="0"/>
+          </a:p>
+          <a:p>
+            <a:pPr marL="114300" indent="0">
+              <a:lnSpc>
+                <a:spcPct val="100000"/>
+              </a:lnSpc>
+              <a:buNone/>
+            </a:pPr>
             <a:endParaRPr lang="en-US" sz="1400" dirty="0"/>
           </a:p>
           <a:p>
             <a:pPr marL="114300" indent="0">
-              <a:buNone/>
-            </a:pPr>
-            <a:endParaRPr lang="en-US" sz="1400" dirty="0"/>
-          </a:p>
-          <a:p>
-            <a:pPr marL="114300" indent="0">
+              <a:lnSpc>
+                <a:spcPct val="100000"/>
+              </a:lnSpc>
               <a:buNone/>
             </a:pPr>
             <a:r>
               <a:rPr lang="en-US" sz="1400" dirty="0"/>
-              <a:t>[4] Bogota Health Observatory: </a:t>
-            </a:r>
-            <a:r>
-              <a:rPr lang="en-US" sz="1400" dirty="0">
+              <a:t>[4] Bogota Health Observatory</a:t>
+            </a:r>
+          </a:p>
+          <a:p>
+            <a:pPr marL="571500" lvl="1" indent="0">
+              <a:lnSpc>
+                <a:spcPct val="100000"/>
+              </a:lnSpc>
+              <a:buNone/>
+            </a:pPr>
+            <a:r>
+              <a:rPr lang="en-US" sz="800" dirty="0">
                 <a:hlinkClick r:id="rId3"/>
               </a:rPr>
               <a:t>https://saludata.saludcapital.gov.co/osb/index.php/datos-de-salud/enfermedades-trasmisibles/covid19/</a:t>
             </a:r>
+            <a:endParaRPr lang="en-US" sz="1000" dirty="0"/>
+          </a:p>
+          <a:p>
+            <a:pPr marL="114300" indent="0">
+              <a:lnSpc>
+                <a:spcPct val="100000"/>
+              </a:lnSpc>
+              <a:buNone/>
+            </a:pPr>
             <a:endParaRPr lang="en-US" sz="1400" dirty="0"/>
           </a:p>
           <a:p>
             <a:pPr marL="114300" indent="0">
-              <a:buNone/>
-            </a:pPr>
-            <a:endParaRPr lang="en-US" sz="1400" dirty="0"/>
-          </a:p>
-          <a:p>
-            <a:pPr marL="114300" indent="0">
+              <a:lnSpc>
+                <a:spcPct val="100000"/>
+              </a:lnSpc>
               <a:buNone/>
             </a:pPr>
             <a:r>
@@ -11523,27 +11467,23 @@
             </a:r>
             <a:r>
               <a:rPr lang="en-US" sz="1400" dirty="0"/>
-              <a:t>: </a:t>
-            </a:r>
-            <a:r>
-              <a:rPr lang="en-US" sz="1400" dirty="0">
+              <a:t> </a:t>
+            </a:r>
+          </a:p>
+          <a:p>
+            <a:pPr marL="571500" lvl="1" indent="0">
+              <a:lnSpc>
+                <a:spcPct val="100000"/>
+              </a:lnSpc>
+              <a:buNone/>
+            </a:pPr>
+            <a:r>
+              <a:rPr lang="en-US" sz="800" dirty="0">
                 <a:hlinkClick r:id="rId6"/>
               </a:rPr>
               <a:t>https://github.com/wcota/covid19br</a:t>
             </a:r>
-            <a:endParaRPr lang="en-US" sz="1400" dirty="0"/>
-          </a:p>
-          <a:p>
-            <a:pPr marL="114300" indent="0">
-              <a:buNone/>
-            </a:pPr>
-            <a:endParaRPr lang="en-US" sz="1400" dirty="0"/>
-          </a:p>
-          <a:p>
-            <a:pPr marL="114300" indent="0">
-              <a:buNone/>
-            </a:pPr>
-            <a:endParaRPr lang="en-US" sz="1400" dirty="0"/>
+            <a:endParaRPr lang="en-US" sz="1000" dirty="0"/>
           </a:p>
         </p:txBody>
       </p:sp>
@@ -11898,231 +11838,6 @@
   <p:cSld>
     <p:spTree>
       <p:nvGrpSpPr>
-        <p:cNvPr id="1" name="Shape 158"/>
-        <p:cNvGrpSpPr/>
-        <p:nvPr/>
-      </p:nvGrpSpPr>
-      <p:grpSpPr>
-        <a:xfrm>
-          <a:off x="0" y="0"/>
-          <a:ext cx="0" cy="0"/>
-          <a:chOff x="0" y="0"/>
-          <a:chExt cx="0" cy="0"/>
-        </a:xfrm>
-      </p:grpSpPr>
-      <p:sp>
-        <p:nvSpPr>
-          <p:cNvPr id="159" name="Google Shape;159;p27"/>
-          <p:cNvSpPr txBox="1">
-            <a:spLocks noGrp="1"/>
-          </p:cNvSpPr>
-          <p:nvPr>
-            <p:ph type="title"/>
-          </p:nvPr>
-        </p:nvSpPr>
-        <p:spPr>
-          <a:prstGeom prst="rect">
-            <a:avLst/>
-          </a:prstGeom>
-        </p:spPr>
-        <p:txBody>
-          <a:bodyPr spcFirstLastPara="1" wrap="square" lIns="91425" tIns="91425" rIns="91425" bIns="91425" anchor="t" anchorCtr="0">
-            <a:normAutofit/>
-          </a:bodyPr>
-          <a:lstStyle/>
-          <a:p>
-            <a:pPr marL="0" lvl="0" indent="0" algn="l" rtl="0">
-              <a:spcBef>
-                <a:spcPts val="0"/>
-              </a:spcBef>
-              <a:spcAft>
-                <a:spcPts val="0"/>
-              </a:spcAft>
-              <a:buNone/>
-            </a:pPr>
-            <a:r>
-              <a:rPr lang="en"/>
-              <a:t>Project Team Profiles</a:t>
-            </a:r>
-            <a:endParaRPr/>
-          </a:p>
-        </p:txBody>
-      </p:sp>
-      <p:sp>
-        <p:nvSpPr>
-          <p:cNvPr id="160" name="Google Shape;160;p27"/>
-          <p:cNvSpPr txBox="1">
-            <a:spLocks noGrp="1"/>
-          </p:cNvSpPr>
-          <p:nvPr>
-            <p:ph type="body" idx="1"/>
-          </p:nvPr>
-        </p:nvSpPr>
-        <p:spPr>
-          <a:prstGeom prst="rect">
-            <a:avLst/>
-          </a:prstGeom>
-        </p:spPr>
-        <p:txBody>
-          <a:bodyPr spcFirstLastPara="1" wrap="square" lIns="91425" tIns="91425" rIns="91425" bIns="91425" anchor="t" anchorCtr="0">
-            <a:normAutofit/>
-          </a:bodyPr>
-          <a:lstStyle/>
-          <a:p>
-            <a:pPr marL="0" lvl="0" indent="0" algn="l" rtl="0">
-              <a:spcBef>
-                <a:spcPts val="0"/>
-              </a:spcBef>
-              <a:spcAft>
-                <a:spcPts val="0"/>
-              </a:spcAft>
-              <a:buNone/>
-            </a:pPr>
-            <a:r>
-              <a:rPr lang="en" dirty="0"/>
-              <a:t>Aisha Syed </a:t>
-            </a:r>
-            <a:r>
-              <a:rPr lang="en" u="sng" dirty="0">
-                <a:solidFill>
-                  <a:schemeClr val="hlink"/>
-                </a:solidFill>
-                <a:hlinkClick r:id="rId3"/>
-              </a:rPr>
-              <a:t>https://www.linkedin.com/in/aisha-syed-27506a5/</a:t>
-            </a:r>
-            <a:endParaRPr dirty="0"/>
-          </a:p>
-          <a:p>
-            <a:pPr marL="0" lvl="0" indent="0" algn="l" rtl="0">
-              <a:spcBef>
-                <a:spcPts val="1200"/>
-              </a:spcBef>
-              <a:spcAft>
-                <a:spcPts val="0"/>
-              </a:spcAft>
-              <a:buNone/>
-            </a:pPr>
-            <a:endParaRPr dirty="0"/>
-          </a:p>
-          <a:p>
-            <a:pPr marL="0" lvl="0" indent="0" algn="l" rtl="0">
-              <a:spcBef>
-                <a:spcPts val="1200"/>
-              </a:spcBef>
-              <a:spcAft>
-                <a:spcPts val="0"/>
-              </a:spcAft>
-              <a:buNone/>
-            </a:pPr>
-            <a:endParaRPr dirty="0"/>
-          </a:p>
-          <a:p>
-            <a:pPr marL="0" lvl="0" indent="0" algn="l" rtl="0">
-              <a:spcBef>
-                <a:spcPts val="1200"/>
-              </a:spcBef>
-              <a:spcAft>
-                <a:spcPts val="0"/>
-              </a:spcAft>
-              <a:buNone/>
-            </a:pPr>
-            <a:r>
-              <a:rPr lang="en" dirty="0"/>
-              <a:t>Maria Leon </a:t>
-            </a:r>
-            <a:r>
-              <a:rPr lang="en" u="sng" dirty="0">
-                <a:solidFill>
-                  <a:schemeClr val="hlink"/>
-                </a:solidFill>
-                <a:hlinkClick r:id="rId4"/>
-              </a:rPr>
-              <a:t>https://www.linkedin.com/in/marialeon2009/</a:t>
-            </a:r>
-            <a:r>
-              <a:rPr lang="en" dirty="0"/>
-              <a:t> </a:t>
-            </a:r>
-            <a:endParaRPr dirty="0"/>
-          </a:p>
-          <a:p>
-            <a:pPr marL="0" lvl="0" indent="0" algn="l" rtl="0">
-              <a:spcBef>
-                <a:spcPts val="1200"/>
-              </a:spcBef>
-              <a:spcAft>
-                <a:spcPts val="0"/>
-              </a:spcAft>
-              <a:buNone/>
-            </a:pPr>
-            <a:r>
-              <a:rPr lang="en" sz="2000" dirty="0"/>
-              <a:t>Sushmitha </a:t>
-            </a:r>
-            <a:r>
-              <a:rPr lang="en" sz="1600" u="sng" dirty="0">
-                <a:solidFill>
-                  <a:schemeClr val="hlink"/>
-                </a:solidFill>
-                <a:hlinkClick r:id="rId5"/>
-              </a:rPr>
-              <a:t>linkedin.com/in/sushmitha-maddali</a:t>
-            </a:r>
-            <a:endParaRPr sz="1600" u="sng" dirty="0">
-              <a:solidFill>
-                <a:schemeClr val="hlink"/>
-              </a:solidFill>
-            </a:endParaRPr>
-          </a:p>
-          <a:p>
-            <a:pPr marL="0" lvl="0" indent="0" algn="l" rtl="0">
-              <a:spcBef>
-                <a:spcPts val="1200"/>
-              </a:spcBef>
-              <a:spcAft>
-                <a:spcPts val="0"/>
-              </a:spcAft>
-              <a:buClr>
-                <a:schemeClr val="dk1"/>
-              </a:buClr>
-              <a:buSzPts val="1100"/>
-              <a:buFont typeface="Arial"/>
-              <a:buNone/>
-            </a:pPr>
-            <a:endParaRPr sz="1200" dirty="0">
-              <a:solidFill>
-                <a:schemeClr val="dk1"/>
-              </a:solidFill>
-            </a:endParaRPr>
-          </a:p>
-          <a:p>
-            <a:pPr marL="0" lvl="0" indent="0" algn="l" rtl="0">
-              <a:spcBef>
-                <a:spcPts val="0"/>
-              </a:spcBef>
-              <a:spcAft>
-                <a:spcPts val="1200"/>
-              </a:spcAft>
-              <a:buNone/>
-            </a:pPr>
-            <a:endParaRPr dirty="0"/>
-          </a:p>
-        </p:txBody>
-      </p:sp>
-    </p:spTree>
-  </p:cSld>
-  <p:clrMapOvr>
-    <a:masterClrMapping/>
-  </p:clrMapOvr>
-</p:sld>
-</file>
-
-<file path=ppt/slides/slide27.xml><?xml version="1.0" encoding="utf-8"?>
-<p:sld xmlns:a="http://schemas.openxmlformats.org/drawingml/2006/main" xmlns:r="http://schemas.openxmlformats.org/officeDocument/2006/relationships" xmlns:p="http://schemas.openxmlformats.org/presentationml/2006/main" show="0">
-  <p:cSld>
-    <p:spTree>
-      <p:nvGrpSpPr>
         <p:cNvPr id="1" name="Shape 146"/>
         <p:cNvGrpSpPr/>
         <p:nvPr/>
@@ -12288,7 +12003,7 @@
 </p:sld>
 </file>
 
-<file path=ppt/slides/slide28.xml><?xml version="1.0" encoding="utf-8"?>
+<file path=ppt/slides/slide27.xml><?xml version="1.0" encoding="utf-8"?>
 <p:sld xmlns:a="http://schemas.openxmlformats.org/drawingml/2006/main" xmlns:r="http://schemas.openxmlformats.org/officeDocument/2006/relationships" xmlns:p="http://schemas.openxmlformats.org/presentationml/2006/main" show="0">
   <p:cSld>
     <p:spTree>

</xml_diff>